<commit_message>
change cover slide content font color to light-blue
</commit_message>
<xml_diff>
--- a/theme/CyberpunK-theme.pptx
+++ b/theme/CyberpunK-theme.pptx
@@ -24353,10 +24353,19 @@
         </p:nvSpPr>
         <p:spPr/>
         <p:txBody>
-          <a:bodyPr/>
+          <a:bodyPr>
+            <a:normAutofit/>
+          </a:bodyPr>
           <a:lstStyle/>
           <a:p>
-            <a:endParaRPr lang="en-US"/>
+            <a:endParaRPr lang="en-US" dirty="0">
+              <a:solidFill>
+                <a:schemeClr val="accent5">
+                  <a:lumMod val="40000"/>
+                  <a:lumOff val="60000"/>
+                </a:schemeClr>
+              </a:solidFill>
+            </a:endParaRPr>
           </a:p>
         </p:txBody>
       </p:sp>

</xml_diff>